<commit_message>
GHC CLI vs GUI
</commit_message>
<xml_diff>
--- a/S01_Intro/02_EjerciciosHaskell+TreeSort+TAD_TABLA/haskell.pptx
+++ b/S01_Intro/02_EjerciciosHaskell+TreeSort+TAD_TABLA/haskell.pptx
@@ -21,6 +21,7 @@
     <p:sldId id="269" r:id="rId15"/>
     <p:sldId id="270" r:id="rId16"/>
     <p:sldId id="271" r:id="rId17"/>
+    <p:sldId id="272" r:id="rId18"/>
   </p:sldIdLst>
   <p:sldSz cx="12192000" cy="6858000"/>
   <p:notesSz cx="6858000" cy="9144000"/>
@@ -274,7 +275,7 @@
           <a:p>
             <a:fld id="{CD596000-7419-462D-B732-6F5D798F4BB6}" type="datetimeFigureOut">
               <a:rPr lang="en-US" smtClean="0"/>
-              <a:t>2/25/2026</a:t>
+              <a:t>2/27/2026</a:t>
             </a:fld>
             <a:endParaRPr lang="en-US"/>
           </a:p>
@@ -472,7 +473,7 @@
           <a:p>
             <a:fld id="{CD596000-7419-462D-B732-6F5D798F4BB6}" type="datetimeFigureOut">
               <a:rPr lang="en-US" smtClean="0"/>
-              <a:t>2/25/2026</a:t>
+              <a:t>2/27/2026</a:t>
             </a:fld>
             <a:endParaRPr lang="en-US"/>
           </a:p>
@@ -680,7 +681,7 @@
           <a:p>
             <a:fld id="{CD596000-7419-462D-B732-6F5D798F4BB6}" type="datetimeFigureOut">
               <a:rPr lang="en-US" smtClean="0"/>
-              <a:t>2/25/2026</a:t>
+              <a:t>2/27/2026</a:t>
             </a:fld>
             <a:endParaRPr lang="en-US"/>
           </a:p>
@@ -878,7 +879,7 @@
           <a:p>
             <a:fld id="{CD596000-7419-462D-B732-6F5D798F4BB6}" type="datetimeFigureOut">
               <a:rPr lang="en-US" smtClean="0"/>
-              <a:t>2/25/2026</a:t>
+              <a:t>2/27/2026</a:t>
             </a:fld>
             <a:endParaRPr lang="en-US"/>
           </a:p>
@@ -1153,7 +1154,7 @@
           <a:p>
             <a:fld id="{CD596000-7419-462D-B732-6F5D798F4BB6}" type="datetimeFigureOut">
               <a:rPr lang="en-US" smtClean="0"/>
-              <a:t>2/25/2026</a:t>
+              <a:t>2/27/2026</a:t>
             </a:fld>
             <a:endParaRPr lang="en-US"/>
           </a:p>
@@ -1418,7 +1419,7 @@
           <a:p>
             <a:fld id="{CD596000-7419-462D-B732-6F5D798F4BB6}" type="datetimeFigureOut">
               <a:rPr lang="en-US" smtClean="0"/>
-              <a:t>2/25/2026</a:t>
+              <a:t>2/27/2026</a:t>
             </a:fld>
             <a:endParaRPr lang="en-US"/>
           </a:p>
@@ -1830,7 +1831,7 @@
           <a:p>
             <a:fld id="{CD596000-7419-462D-B732-6F5D798F4BB6}" type="datetimeFigureOut">
               <a:rPr lang="en-US" smtClean="0"/>
-              <a:t>2/25/2026</a:t>
+              <a:t>2/27/2026</a:t>
             </a:fld>
             <a:endParaRPr lang="en-US"/>
           </a:p>
@@ -1971,7 +1972,7 @@
           <a:p>
             <a:fld id="{CD596000-7419-462D-B732-6F5D798F4BB6}" type="datetimeFigureOut">
               <a:rPr lang="en-US" smtClean="0"/>
-              <a:t>2/25/2026</a:t>
+              <a:t>2/27/2026</a:t>
             </a:fld>
             <a:endParaRPr lang="en-US"/>
           </a:p>
@@ -2084,7 +2085,7 @@
           <a:p>
             <a:fld id="{CD596000-7419-462D-B732-6F5D798F4BB6}" type="datetimeFigureOut">
               <a:rPr lang="en-US" smtClean="0"/>
-              <a:t>2/25/2026</a:t>
+              <a:t>2/27/2026</a:t>
             </a:fld>
             <a:endParaRPr lang="en-US"/>
           </a:p>
@@ -2395,7 +2396,7 @@
           <a:p>
             <a:fld id="{CD596000-7419-462D-B732-6F5D798F4BB6}" type="datetimeFigureOut">
               <a:rPr lang="en-US" smtClean="0"/>
-              <a:t>2/25/2026</a:t>
+              <a:t>2/27/2026</a:t>
             </a:fld>
             <a:endParaRPr lang="en-US"/>
           </a:p>
@@ -2683,7 +2684,7 @@
           <a:p>
             <a:fld id="{CD596000-7419-462D-B732-6F5D798F4BB6}" type="datetimeFigureOut">
               <a:rPr lang="en-US" smtClean="0"/>
-              <a:t>2/25/2026</a:t>
+              <a:t>2/27/2026</a:t>
             </a:fld>
             <a:endParaRPr lang="en-US"/>
           </a:p>
@@ -2924,7 +2925,7 @@
           <a:p>
             <a:fld id="{CD596000-7419-462D-B732-6F5D798F4BB6}" type="datetimeFigureOut">
               <a:rPr lang="en-US" smtClean="0"/>
-              <a:t>2/25/2026</a:t>
+              <a:t>2/27/2026</a:t>
             </a:fld>
             <a:endParaRPr lang="en-US"/>
           </a:p>
@@ -4854,7 +4855,7 @@
             </a:r>
             <a:r>
               <a:rPr lang="en-US" dirty="0" err="1"/>
-              <a:t>Eliminado</a:t>
+              <a:t>Recursa</a:t>
             </a:r>
             <a:r>
               <a:rPr lang="en-US" dirty="0"/>
@@ -5386,6 +5387,262 @@
     <p:extLst>
       <p:ext uri="{BB962C8B-B14F-4D97-AF65-F5344CB8AC3E}">
         <p14:creationId xmlns:p14="http://schemas.microsoft.com/office/powerpoint/2010/main" val="2763147796"/>
+      </p:ext>
+    </p:extLst>
+  </p:cSld>
+  <p:clrMapOvr>
+    <a:masterClrMapping/>
+  </p:clrMapOvr>
+</p:sld>
+</file>
+
+<file path=ppt/slides/slide17.xml><?xml version="1.0" encoding="utf-8"?>
+<p:sld xmlns:a="http://schemas.openxmlformats.org/drawingml/2006/main" xmlns:r="http://schemas.openxmlformats.org/officeDocument/2006/relationships" xmlns:p="http://schemas.openxmlformats.org/presentationml/2006/main">
+  <p:cSld>
+    <p:spTree>
+      <p:nvGrpSpPr>
+        <p:cNvPr id="1" name=""/>
+        <p:cNvGrpSpPr/>
+        <p:nvPr/>
+      </p:nvGrpSpPr>
+      <p:grpSpPr>
+        <a:xfrm>
+          <a:off x="0" y="0"/>
+          <a:ext cx="0" cy="0"/>
+          <a:chOff x="0" y="0"/>
+          <a:chExt cx="0" cy="0"/>
+        </a:xfrm>
+      </p:grpSpPr>
+      <p:sp>
+        <p:nvSpPr>
+          <p:cNvPr id="2" name="Title 1">
+            <a:extLst>
+              <a:ext uri="{FF2B5EF4-FFF2-40B4-BE49-F238E27FC236}">
+                <a16:creationId xmlns:a16="http://schemas.microsoft.com/office/drawing/2014/main" id="{CFA544C1-E532-F26C-D780-64884FAF08BD}"/>
+              </a:ext>
+            </a:extLst>
+          </p:cNvPr>
+          <p:cNvSpPr>
+            <a:spLocks noGrp="1"/>
+          </p:cNvSpPr>
+          <p:nvPr>
+            <p:ph type="title"/>
+          </p:nvPr>
+        </p:nvSpPr>
+        <p:spPr/>
+        <p:txBody>
+          <a:bodyPr/>
+          <a:lstStyle/>
+          <a:p>
+            <a:r>
+              <a:rPr lang="en-US" dirty="0"/>
+              <a:t>CLI vs GUI</a:t>
+            </a:r>
+          </a:p>
+        </p:txBody>
+      </p:sp>
+      <p:pic>
+        <p:nvPicPr>
+          <p:cNvPr id="5" name="Picture 4">
+            <a:extLst>
+              <a:ext uri="{FF2B5EF4-FFF2-40B4-BE49-F238E27FC236}">
+                <a16:creationId xmlns:a16="http://schemas.microsoft.com/office/drawing/2014/main" id="{230C816C-4EE8-5591-4410-5D49C57EE8E1}"/>
+              </a:ext>
+            </a:extLst>
+          </p:cNvPr>
+          <p:cNvPicPr>
+            <a:picLocks noChangeAspect="1"/>
+          </p:cNvPicPr>
+          <p:nvPr/>
+        </p:nvPicPr>
+        <p:blipFill>
+          <a:blip r:embed="rId2"/>
+          <a:stretch>
+            <a:fillRect/>
+          </a:stretch>
+        </p:blipFill>
+        <p:spPr>
+          <a:xfrm>
+            <a:off x="9920244" y="152400"/>
+            <a:ext cx="2106576" cy="2657529"/>
+          </a:xfrm>
+          <a:prstGeom prst="rect">
+            <a:avLst/>
+          </a:prstGeom>
+        </p:spPr>
+      </p:pic>
+      <p:pic>
+        <p:nvPicPr>
+          <p:cNvPr id="7" name="Picture 6">
+            <a:extLst>
+              <a:ext uri="{FF2B5EF4-FFF2-40B4-BE49-F238E27FC236}">
+                <a16:creationId xmlns:a16="http://schemas.microsoft.com/office/drawing/2014/main" id="{FA9D2930-C4CB-3832-8EBA-7171A6485D5F}"/>
+              </a:ext>
+            </a:extLst>
+          </p:cNvPr>
+          <p:cNvPicPr>
+            <a:picLocks noChangeAspect="1"/>
+          </p:cNvPicPr>
+          <p:nvPr/>
+        </p:nvPicPr>
+        <p:blipFill>
+          <a:blip r:embed="rId3"/>
+          <a:stretch>
+            <a:fillRect/>
+          </a:stretch>
+        </p:blipFill>
+        <p:spPr>
+          <a:xfrm>
+            <a:off x="688935" y="1437951"/>
+            <a:ext cx="7334250" cy="4730678"/>
+          </a:xfrm>
+          <a:prstGeom prst="rect">
+            <a:avLst/>
+          </a:prstGeom>
+        </p:spPr>
+      </p:pic>
+      <p:sp>
+        <p:nvSpPr>
+          <p:cNvPr id="10" name="TextBox 9">
+            <a:extLst>
+              <a:ext uri="{FF2B5EF4-FFF2-40B4-BE49-F238E27FC236}">
+                <a16:creationId xmlns:a16="http://schemas.microsoft.com/office/drawing/2014/main" id="{29B0F568-193A-6BFF-6BA0-99B46E58CBA5}"/>
+              </a:ext>
+            </a:extLst>
+          </p:cNvPr>
+          <p:cNvSpPr txBox="1"/>
+          <p:nvPr/>
+        </p:nvSpPr>
+        <p:spPr>
+          <a:xfrm>
+            <a:off x="8023185" y="3586407"/>
+            <a:ext cx="4381501" cy="923330"/>
+          </a:xfrm>
+          <a:prstGeom prst="rect">
+            <a:avLst/>
+          </a:prstGeom>
+          <a:noFill/>
+        </p:spPr>
+        <p:txBody>
+          <a:bodyPr wrap="square" rtlCol="0">
+            <a:spAutoFit/>
+          </a:bodyPr>
+          <a:lstStyle/>
+          <a:p>
+            <a:r>
+              <a:rPr lang="en-US" dirty="0"/>
+              <a:t>Tip: </a:t>
+            </a:r>
+          </a:p>
+          <a:p>
+            <a:r>
+              <a:rPr lang="en-US" dirty="0"/>
+              <a:t>Tener </a:t>
+            </a:r>
+            <a:r>
+              <a:rPr lang="en-US" dirty="0" err="1"/>
+              <a:t>siempre</a:t>
+            </a:r>
+            <a:r>
+              <a:rPr lang="en-US" dirty="0"/>
+              <a:t> a mano </a:t>
+            </a:r>
+            <a:r>
+              <a:rPr lang="en-US" dirty="0" err="1"/>
+              <a:t>una</a:t>
+            </a:r>
+            <a:r>
+              <a:rPr lang="en-US" dirty="0"/>
+              <a:t> </a:t>
+            </a:r>
+            <a:r>
+              <a:rPr lang="en-US" dirty="0" err="1"/>
+              <a:t>cheatsheet</a:t>
+            </a:r>
+            <a:r>
+              <a:rPr lang="en-US" dirty="0"/>
+              <a:t> de Haskell</a:t>
+            </a:r>
+          </a:p>
+        </p:txBody>
+      </p:sp>
+      <p:sp>
+        <p:nvSpPr>
+          <p:cNvPr id="12" name="TextBox 11">
+            <a:extLst>
+              <a:ext uri="{FF2B5EF4-FFF2-40B4-BE49-F238E27FC236}">
+                <a16:creationId xmlns:a16="http://schemas.microsoft.com/office/drawing/2014/main" id="{E6E50D6F-BA38-1641-DACD-2B4606B61118}"/>
+              </a:ext>
+            </a:extLst>
+          </p:cNvPr>
+          <p:cNvSpPr txBox="1"/>
+          <p:nvPr/>
+        </p:nvSpPr>
+        <p:spPr>
+          <a:xfrm>
+            <a:off x="8023185" y="4705648"/>
+            <a:ext cx="6200774" cy="369332"/>
+          </a:xfrm>
+          <a:prstGeom prst="rect">
+            <a:avLst/>
+          </a:prstGeom>
+          <a:noFill/>
+        </p:spPr>
+        <p:txBody>
+          <a:bodyPr wrap="square">
+            <a:spAutoFit/>
+          </a:bodyPr>
+          <a:lstStyle/>
+          <a:p>
+            <a:r>
+              <a:rPr lang="en-US" dirty="0">
+                <a:hlinkClick r:id="rId4"/>
+              </a:rPr>
+              <a:t>https://matela.com.br/haskell-cs.pdf</a:t>
+            </a:r>
+            <a:endParaRPr lang="en-US" dirty="0"/>
+          </a:p>
+        </p:txBody>
+      </p:sp>
+      <p:sp>
+        <p:nvSpPr>
+          <p:cNvPr id="14" name="TextBox 13">
+            <a:extLst>
+              <a:ext uri="{FF2B5EF4-FFF2-40B4-BE49-F238E27FC236}">
+                <a16:creationId xmlns:a16="http://schemas.microsoft.com/office/drawing/2014/main" id="{637D9E74-ED41-F36A-826A-3BD6EED87C91}"/>
+              </a:ext>
+            </a:extLst>
+          </p:cNvPr>
+          <p:cNvSpPr txBox="1"/>
+          <p:nvPr/>
+        </p:nvSpPr>
+        <p:spPr>
+          <a:xfrm>
+            <a:off x="838200" y="6168629"/>
+            <a:ext cx="7115174" cy="369332"/>
+          </a:xfrm>
+          <a:prstGeom prst="rect">
+            <a:avLst/>
+          </a:prstGeom>
+          <a:noFill/>
+        </p:spPr>
+        <p:txBody>
+          <a:bodyPr wrap="square">
+            <a:spAutoFit/>
+          </a:bodyPr>
+          <a:lstStyle/>
+          <a:p>
+            <a:r>
+              <a:rPr lang="en-US" dirty="0"/>
+              <a:t>Kind of a type		             &gt;   :k </a:t>
+            </a:r>
+          </a:p>
+        </p:txBody>
+      </p:sp>
+    </p:spTree>
+    <p:extLst>
+      <p:ext uri="{BB962C8B-B14F-4D97-AF65-F5344CB8AC3E}">
+        <p14:creationId xmlns:p14="http://schemas.microsoft.com/office/powerpoint/2010/main" val="1277071704"/>
       </p:ext>
     </p:extLst>
   </p:cSld>

</xml_diff>